<commit_message>
update msgpack module test py
</commit_message>
<xml_diff>
--- a/序列化/msgpack.pptx
+++ b/序列化/msgpack.pptx
@@ -5,7 +5,7 @@
     <p:sldMasterId id="2147483648" r:id="rId1"/>
   </p:sldMasterIdLst>
   <p:notesMasterIdLst>
-    <p:notesMasterId r:id="rId12"/>
+    <p:notesMasterId r:id="rId14"/>
   </p:notesMasterIdLst>
   <p:sldIdLst>
     <p:sldId id="256" r:id="rId2"/>
@@ -14,10 +14,12 @@
     <p:sldId id="275" r:id="rId5"/>
     <p:sldId id="276" r:id="rId6"/>
     <p:sldId id="277" r:id="rId7"/>
-    <p:sldId id="278" r:id="rId8"/>
-    <p:sldId id="272" r:id="rId9"/>
-    <p:sldId id="273" r:id="rId10"/>
-    <p:sldId id="264" r:id="rId11"/>
+    <p:sldId id="279" r:id="rId8"/>
+    <p:sldId id="280" r:id="rId9"/>
+    <p:sldId id="278" r:id="rId10"/>
+    <p:sldId id="272" r:id="rId11"/>
+    <p:sldId id="273" r:id="rId12"/>
+    <p:sldId id="264" r:id="rId13"/>
   </p:sldIdLst>
   <p:sldSz cx="12192000" cy="6858000"/>
   <p:notesSz cx="6858000" cy="9144000"/>
@@ -206,7 +208,7 @@
           <a:p>
             <a:fld id="{AE487ED9-758D-4B02-9A80-6B001BA3A387}" type="datetimeFigureOut">
               <a:rPr lang="zh-CN" altLang="en-US" smtClean="0"/>
-              <a:t>2018/3/9 Friday</a:t>
+              <a:t>2018/3/10 Saturday</a:t>
             </a:fld>
             <a:endParaRPr lang="zh-CN" altLang="en-US"/>
           </a:p>
@@ -1123,7 +1125,7 @@
           <a:p>
             <a:fld id="{FE62D5D2-312C-43E1-A102-90C732BC9212}" type="slidenum">
               <a:rPr lang="zh-CN" altLang="en-US" smtClean="0"/>
-              <a:t>7</a:t>
+              <a:t>9</a:t>
             </a:fld>
             <a:endParaRPr lang="zh-CN" altLang="en-US"/>
           </a:p>
@@ -1299,7 +1301,7 @@
           <a:p>
             <a:fld id="{FE62D5D2-312C-43E1-A102-90C732BC9212}" type="slidenum">
               <a:rPr lang="zh-CN" altLang="en-US" smtClean="0"/>
-              <a:t>8</a:t>
+              <a:t>10</a:t>
             </a:fld>
             <a:endParaRPr lang="zh-CN" altLang="en-US"/>
           </a:p>
@@ -1383,7 +1385,7 @@
           <a:p>
             <a:fld id="{D793B1E7-136B-46A5-8DC9-9CA62FF0BA41}" type="slidenum">
               <a:rPr lang="en-AU" smtClean="0"/>
-              <a:t>10</a:t>
+              <a:t>12</a:t>
             </a:fld>
             <a:endParaRPr lang="en-AU" dirty="0"/>
           </a:p>
@@ -1533,7 +1535,7 @@
           <a:p>
             <a:fld id="{C4326383-EA1D-4780-A6EA-52FBAE83D431}" type="datetimeFigureOut">
               <a:rPr lang="zh-CN" altLang="en-US" smtClean="0"/>
-              <a:t>2018/3/9 Friday</a:t>
+              <a:t>2018/3/10 Saturday</a:t>
             </a:fld>
             <a:endParaRPr lang="zh-CN" altLang="en-US"/>
           </a:p>
@@ -1703,7 +1705,7 @@
           <a:p>
             <a:fld id="{C4326383-EA1D-4780-A6EA-52FBAE83D431}" type="datetimeFigureOut">
               <a:rPr lang="zh-CN" altLang="en-US" smtClean="0"/>
-              <a:t>2018/3/9 Friday</a:t>
+              <a:t>2018/3/10 Saturday</a:t>
             </a:fld>
             <a:endParaRPr lang="zh-CN" altLang="en-US"/>
           </a:p>
@@ -1883,7 +1885,7 @@
           <a:p>
             <a:fld id="{C4326383-EA1D-4780-A6EA-52FBAE83D431}" type="datetimeFigureOut">
               <a:rPr lang="zh-CN" altLang="en-US" smtClean="0"/>
-              <a:t>2018/3/9 Friday</a:t>
+              <a:t>2018/3/10 Saturday</a:t>
             </a:fld>
             <a:endParaRPr lang="zh-CN" altLang="en-US"/>
           </a:p>
@@ -2577,7 +2579,7 @@
           <a:p>
             <a:fld id="{C4326383-EA1D-4780-A6EA-52FBAE83D431}" type="datetimeFigureOut">
               <a:rPr lang="zh-CN" altLang="en-US" smtClean="0"/>
-              <a:t>2018/3/9 Friday</a:t>
+              <a:t>2018/3/10 Saturday</a:t>
             </a:fld>
             <a:endParaRPr lang="zh-CN" altLang="en-US"/>
           </a:p>
@@ -2823,7 +2825,7 @@
           <a:p>
             <a:fld id="{C4326383-EA1D-4780-A6EA-52FBAE83D431}" type="datetimeFigureOut">
               <a:rPr lang="zh-CN" altLang="en-US" smtClean="0"/>
-              <a:t>2018/3/9 Friday</a:t>
+              <a:t>2018/3/10 Saturday</a:t>
             </a:fld>
             <a:endParaRPr lang="zh-CN" altLang="en-US"/>
           </a:p>
@@ -3055,7 +3057,7 @@
           <a:p>
             <a:fld id="{C4326383-EA1D-4780-A6EA-52FBAE83D431}" type="datetimeFigureOut">
               <a:rPr lang="zh-CN" altLang="en-US" smtClean="0"/>
-              <a:t>2018/3/9 Friday</a:t>
+              <a:t>2018/3/10 Saturday</a:t>
             </a:fld>
             <a:endParaRPr lang="zh-CN" altLang="en-US"/>
           </a:p>
@@ -3422,7 +3424,7 @@
           <a:p>
             <a:fld id="{C4326383-EA1D-4780-A6EA-52FBAE83D431}" type="datetimeFigureOut">
               <a:rPr lang="zh-CN" altLang="en-US" smtClean="0"/>
-              <a:t>2018/3/9 Friday</a:t>
+              <a:t>2018/3/10 Saturday</a:t>
             </a:fld>
             <a:endParaRPr lang="zh-CN" altLang="en-US"/>
           </a:p>
@@ -3540,7 +3542,7 @@
           <a:p>
             <a:fld id="{C4326383-EA1D-4780-A6EA-52FBAE83D431}" type="datetimeFigureOut">
               <a:rPr lang="zh-CN" altLang="en-US" smtClean="0"/>
-              <a:t>2018/3/9 Friday</a:t>
+              <a:t>2018/3/10 Saturday</a:t>
             </a:fld>
             <a:endParaRPr lang="zh-CN" altLang="en-US"/>
           </a:p>
@@ -3635,7 +3637,7 @@
           <a:p>
             <a:fld id="{C4326383-EA1D-4780-A6EA-52FBAE83D431}" type="datetimeFigureOut">
               <a:rPr lang="zh-CN" altLang="en-US" smtClean="0"/>
-              <a:t>2018/3/9 Friday</a:t>
+              <a:t>2018/3/10 Saturday</a:t>
             </a:fld>
             <a:endParaRPr lang="zh-CN" altLang="en-US"/>
           </a:p>
@@ -3912,7 +3914,7 @@
           <a:p>
             <a:fld id="{C4326383-EA1D-4780-A6EA-52FBAE83D431}" type="datetimeFigureOut">
               <a:rPr lang="zh-CN" altLang="en-US" smtClean="0"/>
-              <a:t>2018/3/9 Friday</a:t>
+              <a:t>2018/3/10 Saturday</a:t>
             </a:fld>
             <a:endParaRPr lang="zh-CN" altLang="en-US"/>
           </a:p>
@@ -4165,7 +4167,7 @@
           <a:p>
             <a:fld id="{C4326383-EA1D-4780-A6EA-52FBAE83D431}" type="datetimeFigureOut">
               <a:rPr lang="zh-CN" altLang="en-US" smtClean="0"/>
-              <a:t>2018/3/9 Friday</a:t>
+              <a:t>2018/3/10 Saturday</a:t>
             </a:fld>
             <a:endParaRPr lang="zh-CN" altLang="en-US"/>
           </a:p>
@@ -4378,7 +4380,7 @@
           <a:p>
             <a:fld id="{C4326383-EA1D-4780-A6EA-52FBAE83D431}" type="datetimeFigureOut">
               <a:rPr lang="zh-CN" altLang="en-US" smtClean="0"/>
-              <a:t>2018/3/9 Friday</a:t>
+              <a:t>2018/3/10 Saturday</a:t>
             </a:fld>
             <a:endParaRPr lang="zh-CN" altLang="en-US"/>
           </a:p>
@@ -5035,6 +5037,350 @@
           <a:chExt cx="0" cy="0"/>
         </a:xfrm>
       </p:grpSpPr>
+      <p:pic>
+        <p:nvPicPr>
+          <p:cNvPr id="1026" name="Picture 2" descr="http://dl2.iteye.com/upload/attachment/0095/8875/ab7fc234-7169-3968-bdd8-456811d72dea.png"/>
+          <p:cNvPicPr>
+            <a:picLocks noChangeAspect="1" noChangeArrowheads="1"/>
+          </p:cNvPicPr>
+          <p:nvPr/>
+        </p:nvPicPr>
+        <p:blipFill>
+          <a:blip r:embed="rId3">
+            <a:extLst>
+              <a:ext uri="{28A0092B-C50C-407E-A947-70E740481C1C}">
+                <a14:useLocalDpi xmlns:a14="http://schemas.microsoft.com/office/drawing/2010/main" val="0"/>
+              </a:ext>
+            </a:extLst>
+          </a:blip>
+          <a:srcRect/>
+          <a:stretch>
+            <a:fillRect/>
+          </a:stretch>
+        </p:blipFill>
+        <p:spPr bwMode="auto">
+          <a:xfrm>
+            <a:off x="1582930" y="1431499"/>
+            <a:ext cx="8991600" cy="4381501"/>
+          </a:xfrm>
+          <a:prstGeom prst="rect">
+            <a:avLst/>
+          </a:prstGeom>
+          <a:noFill/>
+          <a:extLst>
+            <a:ext uri="{909E8E84-426E-40DD-AFC4-6F175D3DCCD1}">
+              <a14:hiddenFill xmlns:a14="http://schemas.microsoft.com/office/drawing/2010/main">
+                <a:solidFill>
+                  <a:srgbClr val="FFFFFF"/>
+                </a:solidFill>
+              </a14:hiddenFill>
+            </a:ext>
+          </a:extLst>
+        </p:spPr>
+      </p:pic>
+      <p:sp>
+        <p:nvSpPr>
+          <p:cNvPr id="7" name="Footer Placeholder 5"/>
+          <p:cNvSpPr>
+            <a:spLocks noGrp="1"/>
+          </p:cNvSpPr>
+          <p:nvPr>
+            <p:ph type="ftr" sz="quarter" idx="11"/>
+          </p:nvPr>
+        </p:nvSpPr>
+        <p:spPr>
+          <a:xfrm>
+            <a:off x="4038600" y="6397915"/>
+            <a:ext cx="4114800" cy="365125"/>
+          </a:xfrm>
+        </p:spPr>
+        <p:txBody>
+          <a:bodyPr/>
+          <a:lstStyle/>
+          <a:p>
+            <a:r>
+              <a:rPr lang="en-AU" dirty="0"/>
+              <a:t>http://ulord.one/</a:t>
+            </a:r>
+          </a:p>
+        </p:txBody>
+      </p:sp>
+      <p:sp>
+        <p:nvSpPr>
+          <p:cNvPr id="8" name="Slide Number Placeholder 6"/>
+          <p:cNvSpPr>
+            <a:spLocks noGrp="1"/>
+          </p:cNvSpPr>
+          <p:nvPr>
+            <p:ph type="sldNum" sz="quarter" idx="12"/>
+          </p:nvPr>
+        </p:nvSpPr>
+        <p:spPr>
+          <a:xfrm>
+            <a:off x="8991600" y="6397915"/>
+            <a:ext cx="2881744" cy="365125"/>
+          </a:xfrm>
+        </p:spPr>
+        <p:txBody>
+          <a:bodyPr/>
+          <a:lstStyle/>
+          <a:p>
+            <a:fld id="{870C8D18-4AA2-4B61-82ED-E847FE7F510A}" type="slidenum">
+              <a:rPr lang="en-AU" smtClean="0"/>
+              <a:pPr/>
+              <a:t>10</a:t>
+            </a:fld>
+            <a:endParaRPr lang="en-AU" dirty="0"/>
+          </a:p>
+        </p:txBody>
+      </p:sp>
+      <p:pic>
+        <p:nvPicPr>
+          <p:cNvPr id="9" name="图片 8"/>
+          <p:cNvPicPr>
+            <a:picLocks noChangeAspect="1"/>
+          </p:cNvPicPr>
+          <p:nvPr/>
+        </p:nvPicPr>
+        <p:blipFill>
+          <a:blip r:embed="rId4" cstate="print">
+            <a:extLst>
+              <a:ext uri="{28A0092B-C50C-407E-A947-70E740481C1C}">
+                <a14:useLocalDpi xmlns:a14="http://schemas.microsoft.com/office/drawing/2010/main" val="0"/>
+              </a:ext>
+            </a:extLst>
+          </a:blip>
+          <a:stretch>
+            <a:fillRect/>
+          </a:stretch>
+        </p:blipFill>
+        <p:spPr>
+          <a:xfrm>
+            <a:off x="122664" y="6197018"/>
+            <a:ext cx="1990371" cy="545813"/>
+          </a:xfrm>
+          <a:prstGeom prst="rect">
+            <a:avLst/>
+          </a:prstGeom>
+        </p:spPr>
+      </p:pic>
+    </p:spTree>
+    <p:extLst>
+      <p:ext uri="{BB962C8B-B14F-4D97-AF65-F5344CB8AC3E}">
+        <p14:creationId xmlns:p14="http://schemas.microsoft.com/office/powerpoint/2010/main" val="4239772219"/>
+      </p:ext>
+    </p:extLst>
+  </p:cSld>
+  <p:clrMapOvr>
+    <a:masterClrMapping/>
+  </p:clrMapOvr>
+  <mc:AlternateContent xmlns:mc="http://schemas.openxmlformats.org/markup-compatibility/2006" xmlns:p14="http://schemas.microsoft.com/office/powerpoint/2010/main">
+    <mc:Choice Requires="p14">
+      <p:transition spd="slow" p14:dur="2000"/>
+    </mc:Choice>
+    <mc:Fallback xmlns="">
+      <p:transition spd="slow"/>
+    </mc:Fallback>
+  </mc:AlternateContent>
+  <p:timing>
+    <p:tnLst>
+      <p:par>
+        <p:cTn id="1" dur="indefinite" restart="never" nodeType="tmRoot"/>
+      </p:par>
+    </p:tnLst>
+  </p:timing>
+</p:sld>
+</file>
+
+<file path=ppt/slides/slide11.xml><?xml version="1.0" encoding="utf-8"?>
+<p:sld xmlns:a="http://schemas.openxmlformats.org/drawingml/2006/main" xmlns:r="http://schemas.openxmlformats.org/officeDocument/2006/relationships" xmlns:p="http://schemas.openxmlformats.org/presentationml/2006/main">
+  <p:cSld>
+    <p:spTree>
+      <p:nvGrpSpPr>
+        <p:cNvPr id="1" name=""/>
+        <p:cNvGrpSpPr/>
+        <p:nvPr/>
+      </p:nvGrpSpPr>
+      <p:grpSpPr>
+        <a:xfrm>
+          <a:off x="0" y="0"/>
+          <a:ext cx="0" cy="0"/>
+          <a:chOff x="0" y="0"/>
+          <a:chExt cx="0" cy="0"/>
+        </a:xfrm>
+      </p:grpSpPr>
+      <p:pic>
+        <p:nvPicPr>
+          <p:cNvPr id="2050" name="Picture 2" descr="http://dl2.iteye.com/upload/attachment/0095/8879/44f0c34f-45cc-3ed4-ac53-10059b76fc77.png"/>
+          <p:cNvPicPr>
+            <a:picLocks noChangeAspect="1" noChangeArrowheads="1"/>
+          </p:cNvPicPr>
+          <p:nvPr/>
+        </p:nvPicPr>
+        <p:blipFill>
+          <a:blip r:embed="rId2">
+            <a:extLst>
+              <a:ext uri="{28A0092B-C50C-407E-A947-70E740481C1C}">
+                <a14:useLocalDpi xmlns:a14="http://schemas.microsoft.com/office/drawing/2010/main" val="0"/>
+              </a:ext>
+            </a:extLst>
+          </a:blip>
+          <a:srcRect/>
+          <a:stretch>
+            <a:fillRect/>
+          </a:stretch>
+        </p:blipFill>
+        <p:spPr bwMode="auto">
+          <a:xfrm>
+            <a:off x="2020270" y="1008820"/>
+            <a:ext cx="8572500" cy="4524375"/>
+          </a:xfrm>
+          <a:prstGeom prst="rect">
+            <a:avLst/>
+          </a:prstGeom>
+          <a:noFill/>
+          <a:extLst>
+            <a:ext uri="{909E8E84-426E-40DD-AFC4-6F175D3DCCD1}">
+              <a14:hiddenFill xmlns:a14="http://schemas.microsoft.com/office/drawing/2010/main">
+                <a:solidFill>
+                  <a:srgbClr val="FFFFFF"/>
+                </a:solidFill>
+              </a14:hiddenFill>
+            </a:ext>
+          </a:extLst>
+        </p:spPr>
+      </p:pic>
+      <p:sp>
+        <p:nvSpPr>
+          <p:cNvPr id="7" name="Footer Placeholder 5"/>
+          <p:cNvSpPr>
+            <a:spLocks noGrp="1"/>
+          </p:cNvSpPr>
+          <p:nvPr>
+            <p:ph type="ftr" sz="quarter" idx="11"/>
+          </p:nvPr>
+        </p:nvSpPr>
+        <p:spPr>
+          <a:xfrm>
+            <a:off x="4038600" y="6397915"/>
+            <a:ext cx="4114800" cy="365125"/>
+          </a:xfrm>
+        </p:spPr>
+        <p:txBody>
+          <a:bodyPr/>
+          <a:lstStyle/>
+          <a:p>
+            <a:r>
+              <a:rPr lang="en-AU" dirty="0"/>
+              <a:t>http://ulord.one/</a:t>
+            </a:r>
+          </a:p>
+        </p:txBody>
+      </p:sp>
+      <p:sp>
+        <p:nvSpPr>
+          <p:cNvPr id="8" name="Slide Number Placeholder 6"/>
+          <p:cNvSpPr>
+            <a:spLocks noGrp="1"/>
+          </p:cNvSpPr>
+          <p:nvPr>
+            <p:ph type="sldNum" sz="quarter" idx="12"/>
+          </p:nvPr>
+        </p:nvSpPr>
+        <p:spPr>
+          <a:xfrm>
+            <a:off x="8991600" y="6397915"/>
+            <a:ext cx="2881744" cy="365125"/>
+          </a:xfrm>
+        </p:spPr>
+        <p:txBody>
+          <a:bodyPr/>
+          <a:lstStyle/>
+          <a:p>
+            <a:fld id="{870C8D18-4AA2-4B61-82ED-E847FE7F510A}" type="slidenum">
+              <a:rPr lang="en-AU" smtClean="0"/>
+              <a:pPr/>
+              <a:t>11</a:t>
+            </a:fld>
+            <a:endParaRPr lang="en-AU" dirty="0"/>
+          </a:p>
+        </p:txBody>
+      </p:sp>
+      <p:pic>
+        <p:nvPicPr>
+          <p:cNvPr id="9" name="图片 8"/>
+          <p:cNvPicPr>
+            <a:picLocks noChangeAspect="1"/>
+          </p:cNvPicPr>
+          <p:nvPr/>
+        </p:nvPicPr>
+        <p:blipFill>
+          <a:blip r:embed="rId3" cstate="print">
+            <a:extLst>
+              <a:ext uri="{28A0092B-C50C-407E-A947-70E740481C1C}">
+                <a14:useLocalDpi xmlns:a14="http://schemas.microsoft.com/office/drawing/2010/main" val="0"/>
+              </a:ext>
+            </a:extLst>
+          </a:blip>
+          <a:stretch>
+            <a:fillRect/>
+          </a:stretch>
+        </p:blipFill>
+        <p:spPr>
+          <a:xfrm>
+            <a:off x="122664" y="6197018"/>
+            <a:ext cx="1990371" cy="545813"/>
+          </a:xfrm>
+          <a:prstGeom prst="rect">
+            <a:avLst/>
+          </a:prstGeom>
+        </p:spPr>
+      </p:pic>
+    </p:spTree>
+    <p:extLst>
+      <p:ext uri="{BB962C8B-B14F-4D97-AF65-F5344CB8AC3E}">
+        <p14:creationId xmlns:p14="http://schemas.microsoft.com/office/powerpoint/2010/main" val="1983066399"/>
+      </p:ext>
+    </p:extLst>
+  </p:cSld>
+  <p:clrMapOvr>
+    <a:masterClrMapping/>
+  </p:clrMapOvr>
+  <mc:AlternateContent xmlns:mc="http://schemas.openxmlformats.org/markup-compatibility/2006" xmlns:p14="http://schemas.microsoft.com/office/powerpoint/2010/main">
+    <mc:Choice Requires="p14">
+      <p:transition spd="slow" p14:dur="2000"/>
+    </mc:Choice>
+    <mc:Fallback xmlns="">
+      <p:transition spd="slow"/>
+    </mc:Fallback>
+  </mc:AlternateContent>
+  <p:timing>
+    <p:tnLst>
+      <p:par>
+        <p:cTn id="1" dur="indefinite" restart="never" nodeType="tmRoot"/>
+      </p:par>
+    </p:tnLst>
+  </p:timing>
+</p:sld>
+</file>
+
+<file path=ppt/slides/slide12.xml><?xml version="1.0" encoding="utf-8"?>
+<p:sld xmlns:a="http://schemas.openxmlformats.org/drawingml/2006/main" xmlns:r="http://schemas.openxmlformats.org/officeDocument/2006/relationships" xmlns:p="http://schemas.openxmlformats.org/presentationml/2006/main">
+  <p:cSld>
+    <p:spTree>
+      <p:nvGrpSpPr>
+        <p:cNvPr id="1" name=""/>
+        <p:cNvGrpSpPr/>
+        <p:nvPr/>
+      </p:nvGrpSpPr>
+      <p:grpSpPr>
+        <a:xfrm>
+          <a:off x="0" y="0"/>
+          <a:ext cx="0" cy="0"/>
+          <a:chOff x="0" y="0"/>
+          <a:chExt cx="0" cy="0"/>
+        </a:xfrm>
+      </p:grpSpPr>
       <p:sp>
         <p:nvSpPr>
           <p:cNvPr id="43" name="Rectangle 42"/>
@@ -5115,6 +5461,92 @@
           </a:p>
         </p:txBody>
       </p:sp>
+      <p:sp>
+        <p:nvSpPr>
+          <p:cNvPr id="4" name="Footer Placeholder 5"/>
+          <p:cNvSpPr>
+            <a:spLocks noGrp="1"/>
+          </p:cNvSpPr>
+          <p:nvPr>
+            <p:ph type="ftr" sz="quarter" idx="11"/>
+          </p:nvPr>
+        </p:nvSpPr>
+        <p:spPr>
+          <a:xfrm>
+            <a:off x="4038600" y="6397915"/>
+            <a:ext cx="4114800" cy="365125"/>
+          </a:xfrm>
+        </p:spPr>
+        <p:txBody>
+          <a:bodyPr/>
+          <a:lstStyle/>
+          <a:p>
+            <a:r>
+              <a:rPr lang="en-AU" dirty="0"/>
+              <a:t>http://ulord.one/</a:t>
+            </a:r>
+          </a:p>
+        </p:txBody>
+      </p:sp>
+      <p:sp>
+        <p:nvSpPr>
+          <p:cNvPr id="5" name="Slide Number Placeholder 6"/>
+          <p:cNvSpPr>
+            <a:spLocks noGrp="1"/>
+          </p:cNvSpPr>
+          <p:nvPr>
+            <p:ph type="sldNum" sz="quarter" idx="12"/>
+          </p:nvPr>
+        </p:nvSpPr>
+        <p:spPr>
+          <a:xfrm>
+            <a:off x="8991600" y="6397915"/>
+            <a:ext cx="2881744" cy="365125"/>
+          </a:xfrm>
+        </p:spPr>
+        <p:txBody>
+          <a:bodyPr/>
+          <a:lstStyle/>
+          <a:p>
+            <a:fld id="{870C8D18-4AA2-4B61-82ED-E847FE7F510A}" type="slidenum">
+              <a:rPr lang="en-AU" smtClean="0"/>
+              <a:pPr/>
+              <a:t>2</a:t>
+            </a:fld>
+            <a:endParaRPr lang="en-AU" dirty="0"/>
+          </a:p>
+        </p:txBody>
+      </p:sp>
+      <p:pic>
+        <p:nvPicPr>
+          <p:cNvPr id="7" name="图片 6"/>
+          <p:cNvPicPr>
+            <a:picLocks noChangeAspect="1"/>
+          </p:cNvPicPr>
+          <p:nvPr/>
+        </p:nvPicPr>
+        <p:blipFill>
+          <a:blip r:embed="rId3" cstate="print">
+            <a:extLst>
+              <a:ext uri="{28A0092B-C50C-407E-A947-70E740481C1C}">
+                <a14:useLocalDpi xmlns:a14="http://schemas.microsoft.com/office/drawing/2010/main" val="0"/>
+              </a:ext>
+            </a:extLst>
+          </a:blip>
+          <a:stretch>
+            <a:fillRect/>
+          </a:stretch>
+        </p:blipFill>
+        <p:spPr>
+          <a:xfrm>
+            <a:off x="122664" y="6197018"/>
+            <a:ext cx="1990371" cy="545813"/>
+          </a:xfrm>
+          <a:prstGeom prst="rect">
+            <a:avLst/>
+          </a:prstGeom>
+        </p:spPr>
+      </p:pic>
     </p:spTree>
     <p:extLst>
       <p:ext uri="{BB962C8B-B14F-4D97-AF65-F5344CB8AC3E}">
@@ -9848,14 +10280,14 @@
               <p:nvPr>
                 <p:extLst>
                   <p:ext uri="{D42A27DB-BD31-4B8C-83A1-F6EECF244321}">
-                    <p14:modId xmlns:p14="http://schemas.microsoft.com/office/powerpoint/2010/main" val="2879378279"/>
+                    <p14:modId xmlns:p14="http://schemas.microsoft.com/office/powerpoint/2010/main" val="927838542"/>
                   </p:ext>
                 </p:extLst>
               </p:nvPr>
             </p:nvGraphicFramePr>
             <p:xfrm>
               <a:off x="0" y="0"/>
-              <a:ext cx="12192000" cy="6858000"/>
+              <a:ext cx="12192000" cy="6003235"/>
             </p:xfrm>
             <a:graphic>
               <a:graphicData uri="http://schemas.microsoft.com/office/webextensions/webextension/2010/11">
@@ -9882,7 +10314,7 @@
             <p:spPr>
               <a:xfrm>
                 <a:off x="0" y="0"/>
-                <a:ext cx="12192000" cy="6858000"/>
+                <a:ext cx="12192000" cy="6003235"/>
               </a:xfrm>
               <a:prstGeom prst="rect">
                 <a:avLst/>
@@ -9891,6 +10323,92 @@
           </p:pic>
         </mc:Fallback>
       </mc:AlternateContent>
+      <p:sp>
+        <p:nvSpPr>
+          <p:cNvPr id="13" name="Footer Placeholder 5"/>
+          <p:cNvSpPr>
+            <a:spLocks noGrp="1"/>
+          </p:cNvSpPr>
+          <p:nvPr>
+            <p:ph type="ftr" sz="quarter" idx="11"/>
+          </p:nvPr>
+        </p:nvSpPr>
+        <p:spPr>
+          <a:xfrm>
+            <a:off x="4038600" y="6397915"/>
+            <a:ext cx="4114800" cy="365125"/>
+          </a:xfrm>
+        </p:spPr>
+        <p:txBody>
+          <a:bodyPr/>
+          <a:lstStyle/>
+          <a:p>
+            <a:r>
+              <a:rPr lang="en-AU" dirty="0"/>
+              <a:t>http://ulord.one/</a:t>
+            </a:r>
+          </a:p>
+        </p:txBody>
+      </p:sp>
+      <p:sp>
+        <p:nvSpPr>
+          <p:cNvPr id="14" name="Slide Number Placeholder 6"/>
+          <p:cNvSpPr>
+            <a:spLocks noGrp="1"/>
+          </p:cNvSpPr>
+          <p:nvPr>
+            <p:ph type="sldNum" sz="quarter" idx="12"/>
+          </p:nvPr>
+        </p:nvSpPr>
+        <p:spPr>
+          <a:xfrm>
+            <a:off x="8991600" y="6397915"/>
+            <a:ext cx="2881744" cy="365125"/>
+          </a:xfrm>
+        </p:spPr>
+        <p:txBody>
+          <a:bodyPr/>
+          <a:lstStyle/>
+          <a:p>
+            <a:fld id="{870C8D18-4AA2-4B61-82ED-E847FE7F510A}" type="slidenum">
+              <a:rPr lang="en-AU" smtClean="0"/>
+              <a:pPr/>
+              <a:t>2</a:t>
+            </a:fld>
+            <a:endParaRPr lang="en-AU" dirty="0"/>
+          </a:p>
+        </p:txBody>
+      </p:sp>
+      <p:pic>
+        <p:nvPicPr>
+          <p:cNvPr id="15" name="图片 14"/>
+          <p:cNvPicPr>
+            <a:picLocks noChangeAspect="1"/>
+          </p:cNvPicPr>
+          <p:nvPr/>
+        </p:nvPicPr>
+        <p:blipFill>
+          <a:blip r:embed="rId5" cstate="print">
+            <a:extLst>
+              <a:ext uri="{28A0092B-C50C-407E-A947-70E740481C1C}">
+                <a14:useLocalDpi xmlns:a14="http://schemas.microsoft.com/office/drawing/2010/main" val="0"/>
+              </a:ext>
+            </a:extLst>
+          </a:blip>
+          <a:stretch>
+            <a:fillRect/>
+          </a:stretch>
+        </p:blipFill>
+        <p:spPr>
+          <a:xfrm>
+            <a:off x="122664" y="6197018"/>
+            <a:ext cx="1990371" cy="545813"/>
+          </a:xfrm>
+          <a:prstGeom prst="rect">
+            <a:avLst/>
+          </a:prstGeom>
+        </p:spPr>
+      </p:pic>
     </p:spTree>
     <p:extLst>
       <p:ext uri="{BB962C8B-B14F-4D97-AF65-F5344CB8AC3E}">
@@ -10861,7 +11379,6 @@
               <a:rPr lang="zh-CN" altLang="en-US" dirty="0"/>
               <a:t>模型</a:t>
             </a:r>
-            <a:endParaRPr lang="zh-CN" altLang="en-US" dirty="0"/>
           </a:p>
         </p:txBody>
       </p:sp>
@@ -11384,10 +11901,95 @@
               <a:rPr lang="zh-CN" altLang="en-US" dirty="0"/>
               <a:t>型</a:t>
             </a:r>
-            <a:endParaRPr lang="zh-CN" altLang="en-US" dirty="0"/>
           </a:p>
         </p:txBody>
       </p:sp>
+      <p:sp>
+        <p:nvSpPr>
+          <p:cNvPr id="38" name="Footer Placeholder 5"/>
+          <p:cNvSpPr>
+            <a:spLocks noGrp="1"/>
+          </p:cNvSpPr>
+          <p:nvPr>
+            <p:ph type="ftr" sz="quarter" idx="11"/>
+          </p:nvPr>
+        </p:nvSpPr>
+        <p:spPr>
+          <a:xfrm>
+            <a:off x="4038600" y="6397915"/>
+            <a:ext cx="4114800" cy="365125"/>
+          </a:xfrm>
+        </p:spPr>
+        <p:txBody>
+          <a:bodyPr/>
+          <a:lstStyle/>
+          <a:p>
+            <a:r>
+              <a:rPr lang="en-AU" dirty="0"/>
+              <a:t>http://ulord.one/</a:t>
+            </a:r>
+          </a:p>
+        </p:txBody>
+      </p:sp>
+      <p:sp>
+        <p:nvSpPr>
+          <p:cNvPr id="39" name="Slide Number Placeholder 6"/>
+          <p:cNvSpPr>
+            <a:spLocks noGrp="1"/>
+          </p:cNvSpPr>
+          <p:nvPr>
+            <p:ph type="sldNum" sz="quarter" idx="12"/>
+          </p:nvPr>
+        </p:nvSpPr>
+        <p:spPr>
+          <a:xfrm>
+            <a:off x="8991600" y="6397915"/>
+            <a:ext cx="2881744" cy="365125"/>
+          </a:xfrm>
+        </p:spPr>
+        <p:txBody>
+          <a:bodyPr/>
+          <a:lstStyle/>
+          <a:p>
+            <a:fld id="{870C8D18-4AA2-4B61-82ED-E847FE7F510A}" type="slidenum">
+              <a:rPr lang="en-AU" smtClean="0"/>
+              <a:pPr/>
+              <a:t>2</a:t>
+            </a:fld>
+            <a:endParaRPr lang="en-AU" dirty="0"/>
+          </a:p>
+        </p:txBody>
+      </p:sp>
+      <p:pic>
+        <p:nvPicPr>
+          <p:cNvPr id="40" name="图片 39"/>
+          <p:cNvPicPr>
+            <a:picLocks noChangeAspect="1"/>
+          </p:cNvPicPr>
+          <p:nvPr/>
+        </p:nvPicPr>
+        <p:blipFill>
+          <a:blip r:embed="rId3" cstate="print">
+            <a:extLst>
+              <a:ext uri="{28A0092B-C50C-407E-A947-70E740481C1C}">
+                <a14:useLocalDpi xmlns:a14="http://schemas.microsoft.com/office/drawing/2010/main" val="0"/>
+              </a:ext>
+            </a:extLst>
+          </a:blip>
+          <a:stretch>
+            <a:fillRect/>
+          </a:stretch>
+        </p:blipFill>
+        <p:spPr>
+          <a:xfrm>
+            <a:off x="122664" y="6197018"/>
+            <a:ext cx="1990371" cy="545813"/>
+          </a:xfrm>
+          <a:prstGeom prst="rect">
+            <a:avLst/>
+          </a:prstGeom>
+        </p:spPr>
+      </p:pic>
     </p:spTree>
     <p:extLst>
       <p:ext uri="{BB962C8B-B14F-4D97-AF65-F5344CB8AC3E}">
@@ -12429,6 +13031,92 @@
           </a:p>
         </p:txBody>
       </p:sp>
+      <p:sp>
+        <p:nvSpPr>
+          <p:cNvPr id="13" name="Footer Placeholder 5"/>
+          <p:cNvSpPr>
+            <a:spLocks noGrp="1"/>
+          </p:cNvSpPr>
+          <p:nvPr>
+            <p:ph type="ftr" sz="quarter" idx="11"/>
+          </p:nvPr>
+        </p:nvSpPr>
+        <p:spPr>
+          <a:xfrm>
+            <a:off x="4038600" y="6397915"/>
+            <a:ext cx="4114800" cy="365125"/>
+          </a:xfrm>
+        </p:spPr>
+        <p:txBody>
+          <a:bodyPr/>
+          <a:lstStyle/>
+          <a:p>
+            <a:r>
+              <a:rPr lang="en-AU" dirty="0"/>
+              <a:t>http://ulord.one/</a:t>
+            </a:r>
+          </a:p>
+        </p:txBody>
+      </p:sp>
+      <p:sp>
+        <p:nvSpPr>
+          <p:cNvPr id="14" name="Slide Number Placeholder 6"/>
+          <p:cNvSpPr>
+            <a:spLocks noGrp="1"/>
+          </p:cNvSpPr>
+          <p:nvPr>
+            <p:ph type="sldNum" sz="quarter" idx="12"/>
+          </p:nvPr>
+        </p:nvSpPr>
+        <p:spPr>
+          <a:xfrm>
+            <a:off x="8991600" y="6397915"/>
+            <a:ext cx="2881744" cy="365125"/>
+          </a:xfrm>
+        </p:spPr>
+        <p:txBody>
+          <a:bodyPr/>
+          <a:lstStyle/>
+          <a:p>
+            <a:fld id="{870C8D18-4AA2-4B61-82ED-E847FE7F510A}" type="slidenum">
+              <a:rPr lang="en-AU" smtClean="0"/>
+              <a:pPr/>
+              <a:t>2</a:t>
+            </a:fld>
+            <a:endParaRPr lang="en-AU" dirty="0"/>
+          </a:p>
+        </p:txBody>
+      </p:sp>
+      <p:pic>
+        <p:nvPicPr>
+          <p:cNvPr id="15" name="图片 14"/>
+          <p:cNvPicPr>
+            <a:picLocks noChangeAspect="1"/>
+          </p:cNvPicPr>
+          <p:nvPr/>
+        </p:nvPicPr>
+        <p:blipFill>
+          <a:blip r:embed="rId3" cstate="print">
+            <a:extLst>
+              <a:ext uri="{28A0092B-C50C-407E-A947-70E740481C1C}">
+                <a14:useLocalDpi xmlns:a14="http://schemas.microsoft.com/office/drawing/2010/main" val="0"/>
+              </a:ext>
+            </a:extLst>
+          </a:blip>
+          <a:stretch>
+            <a:fillRect/>
+          </a:stretch>
+        </p:blipFill>
+        <p:spPr>
+          <a:xfrm>
+            <a:off x="122664" y="6197018"/>
+            <a:ext cx="1990371" cy="545813"/>
+          </a:xfrm>
+          <a:prstGeom prst="rect">
+            <a:avLst/>
+          </a:prstGeom>
+        </p:spPr>
+      </p:pic>
     </p:spTree>
     <p:extLst>
       <p:ext uri="{BB962C8B-B14F-4D97-AF65-F5344CB8AC3E}">
@@ -13089,6 +13777,92 @@
           </a:graphicData>
         </a:graphic>
       </p:graphicFrame>
+      <p:sp>
+        <p:nvSpPr>
+          <p:cNvPr id="4" name="Footer Placeholder 5"/>
+          <p:cNvSpPr>
+            <a:spLocks noGrp="1"/>
+          </p:cNvSpPr>
+          <p:nvPr>
+            <p:ph type="ftr" sz="quarter" idx="11"/>
+          </p:nvPr>
+        </p:nvSpPr>
+        <p:spPr>
+          <a:xfrm>
+            <a:off x="4038600" y="6397915"/>
+            <a:ext cx="4114800" cy="365125"/>
+          </a:xfrm>
+        </p:spPr>
+        <p:txBody>
+          <a:bodyPr/>
+          <a:lstStyle/>
+          <a:p>
+            <a:r>
+              <a:rPr lang="en-AU" dirty="0"/>
+              <a:t>http://ulord.one/</a:t>
+            </a:r>
+          </a:p>
+        </p:txBody>
+      </p:sp>
+      <p:sp>
+        <p:nvSpPr>
+          <p:cNvPr id="5" name="Slide Number Placeholder 6"/>
+          <p:cNvSpPr>
+            <a:spLocks noGrp="1"/>
+          </p:cNvSpPr>
+          <p:nvPr>
+            <p:ph type="sldNum" sz="quarter" idx="12"/>
+          </p:nvPr>
+        </p:nvSpPr>
+        <p:spPr>
+          <a:xfrm>
+            <a:off x="8991600" y="6397915"/>
+            <a:ext cx="2881744" cy="365125"/>
+          </a:xfrm>
+        </p:spPr>
+        <p:txBody>
+          <a:bodyPr/>
+          <a:lstStyle/>
+          <a:p>
+            <a:fld id="{870C8D18-4AA2-4B61-82ED-E847FE7F510A}" type="slidenum">
+              <a:rPr lang="en-AU" smtClean="0"/>
+              <a:pPr/>
+              <a:t>2</a:t>
+            </a:fld>
+            <a:endParaRPr lang="en-AU" dirty="0"/>
+          </a:p>
+        </p:txBody>
+      </p:sp>
+      <p:pic>
+        <p:nvPicPr>
+          <p:cNvPr id="7" name="图片 6"/>
+          <p:cNvPicPr>
+            <a:picLocks noChangeAspect="1"/>
+          </p:cNvPicPr>
+          <p:nvPr/>
+        </p:nvPicPr>
+        <p:blipFill>
+          <a:blip r:embed="rId3" cstate="print">
+            <a:extLst>
+              <a:ext uri="{28A0092B-C50C-407E-A947-70E740481C1C}">
+                <a14:useLocalDpi xmlns:a14="http://schemas.microsoft.com/office/drawing/2010/main" val="0"/>
+              </a:ext>
+            </a:extLst>
+          </a:blip>
+          <a:stretch>
+            <a:fillRect/>
+          </a:stretch>
+        </p:blipFill>
+        <p:spPr>
+          <a:xfrm>
+            <a:off x="122664" y="6197018"/>
+            <a:ext cx="1990371" cy="545813"/>
+          </a:xfrm>
+          <a:prstGeom prst="rect">
+            <a:avLst/>
+          </a:prstGeom>
+        </p:spPr>
+      </p:pic>
     </p:spTree>
     <p:extLst>
       <p:ext uri="{BB962C8B-B14F-4D97-AF65-F5344CB8AC3E}">
@@ -13216,6 +13990,30 @@
           <a:chExt cx="0" cy="0"/>
         </a:xfrm>
       </p:grpSpPr>
+      <p:pic>
+        <p:nvPicPr>
+          <p:cNvPr id="6" name="图片 5"/>
+          <p:cNvPicPr>
+            <a:picLocks noChangeAspect="1"/>
+          </p:cNvPicPr>
+          <p:nvPr/>
+        </p:nvPicPr>
+        <p:blipFill>
+          <a:blip r:embed="rId2"/>
+          <a:stretch>
+            <a:fillRect/>
+          </a:stretch>
+        </p:blipFill>
+        <p:spPr>
+          <a:xfrm>
+            <a:off x="1029960" y="1040146"/>
+            <a:ext cx="10238095" cy="4247619"/>
+          </a:xfrm>
+          <a:prstGeom prst="rect">
+            <a:avLst/>
+          </a:prstGeom>
+        </p:spPr>
+      </p:pic>
       <p:sp>
         <p:nvSpPr>
           <p:cNvPr id="7" name="Footer Placeholder 5"/>
@@ -13266,7 +14064,985 @@
             <a:fld id="{870C8D18-4AA2-4B61-82ED-E847FE7F510A}" type="slidenum">
               <a:rPr lang="en-AU" smtClean="0"/>
               <a:pPr/>
-              <a:t>7</a:t>
+              <a:t>2</a:t>
+            </a:fld>
+            <a:endParaRPr lang="en-AU" dirty="0"/>
+          </a:p>
+        </p:txBody>
+      </p:sp>
+      <p:pic>
+        <p:nvPicPr>
+          <p:cNvPr id="9" name="图片 8"/>
+          <p:cNvPicPr>
+            <a:picLocks noChangeAspect="1"/>
+          </p:cNvPicPr>
+          <p:nvPr/>
+        </p:nvPicPr>
+        <p:blipFill>
+          <a:blip r:embed="rId3" cstate="print">
+            <a:extLst>
+              <a:ext uri="{28A0092B-C50C-407E-A947-70E740481C1C}">
+                <a14:useLocalDpi xmlns:a14="http://schemas.microsoft.com/office/drawing/2010/main" val="0"/>
+              </a:ext>
+            </a:extLst>
+          </a:blip>
+          <a:stretch>
+            <a:fillRect/>
+          </a:stretch>
+        </p:blipFill>
+        <p:spPr>
+          <a:xfrm>
+            <a:off x="122664" y="6197018"/>
+            <a:ext cx="1990371" cy="545813"/>
+          </a:xfrm>
+          <a:prstGeom prst="rect">
+            <a:avLst/>
+          </a:prstGeom>
+        </p:spPr>
+      </p:pic>
+    </p:spTree>
+    <p:extLst>
+      <p:ext uri="{BB962C8B-B14F-4D97-AF65-F5344CB8AC3E}">
+        <p14:creationId xmlns:p14="http://schemas.microsoft.com/office/powerpoint/2010/main" val="3755536334"/>
+      </p:ext>
+    </p:extLst>
+  </p:cSld>
+  <p:clrMapOvr>
+    <a:masterClrMapping/>
+  </p:clrMapOvr>
+  <mc:AlternateContent xmlns:mc="http://schemas.openxmlformats.org/markup-compatibility/2006" xmlns:p14="http://schemas.microsoft.com/office/powerpoint/2010/main">
+    <mc:Choice Requires="p14">
+      <p:transition spd="slow" p14:dur="2000"/>
+    </mc:Choice>
+    <mc:Fallback xmlns="">
+      <p:transition spd="slow"/>
+    </mc:Fallback>
+  </mc:AlternateContent>
+</p:sld>
+</file>
+
+<file path=ppt/slides/slide8.xml><?xml version="1.0" encoding="utf-8"?>
+<p:sld xmlns:a="http://schemas.openxmlformats.org/drawingml/2006/main" xmlns:r="http://schemas.openxmlformats.org/officeDocument/2006/relationships" xmlns:p="http://schemas.openxmlformats.org/presentationml/2006/main">
+  <p:cSld>
+    <p:spTree>
+      <p:nvGrpSpPr>
+        <p:cNvPr id="1" name=""/>
+        <p:cNvGrpSpPr/>
+        <p:nvPr/>
+      </p:nvGrpSpPr>
+      <p:grpSpPr>
+        <a:xfrm>
+          <a:off x="0" y="0"/>
+          <a:ext cx="0" cy="0"/>
+          <a:chOff x="0" y="0"/>
+          <a:chExt cx="0" cy="0"/>
+        </a:xfrm>
+      </p:grpSpPr>
+      <p:graphicFrame>
+        <p:nvGraphicFramePr>
+          <p:cNvPr id="8" name="表格 7"/>
+          <p:cNvGraphicFramePr>
+            <a:graphicFrameLocks noGrp="1"/>
+          </p:cNvGraphicFramePr>
+          <p:nvPr>
+            <p:extLst>
+              <p:ext uri="{D42A27DB-BD31-4B8C-83A1-F6EECF244321}">
+                <p14:modId xmlns:p14="http://schemas.microsoft.com/office/powerpoint/2010/main" val="1711842652"/>
+              </p:ext>
+            </p:extLst>
+          </p:nvPr>
+        </p:nvGraphicFramePr>
+        <p:xfrm>
+          <a:off x="1378225" y="848139"/>
+          <a:ext cx="9453213" cy="4850296"/>
+        </p:xfrm>
+        <a:graphic>
+          <a:graphicData uri="http://schemas.openxmlformats.org/drawingml/2006/table">
+            <a:tbl>
+              <a:tblPr firstRow="1" bandRow="1">
+                <a:tableStyleId>{5C22544A-7EE6-4342-B048-85BDC9FD1C3A}</a:tableStyleId>
+              </a:tblPr>
+              <a:tblGrid>
+                <a:gridCol w="1350459">
+                  <a:extLst>
+                    <a:ext uri="{9D8B030D-6E8A-4147-A177-3AD203B41FA5}">
+                      <a16:colId xmlns:a16="http://schemas.microsoft.com/office/drawing/2014/main" val="4196522598"/>
+                    </a:ext>
+                  </a:extLst>
+                </a:gridCol>
+                <a:gridCol w="1350459">
+                  <a:extLst>
+                    <a:ext uri="{9D8B030D-6E8A-4147-A177-3AD203B41FA5}">
+                      <a16:colId xmlns:a16="http://schemas.microsoft.com/office/drawing/2014/main" val="1789990357"/>
+                    </a:ext>
+                  </a:extLst>
+                </a:gridCol>
+                <a:gridCol w="1350459">
+                  <a:extLst>
+                    <a:ext uri="{9D8B030D-6E8A-4147-A177-3AD203B41FA5}">
+                      <a16:colId xmlns:a16="http://schemas.microsoft.com/office/drawing/2014/main" val="3089282119"/>
+                    </a:ext>
+                  </a:extLst>
+                </a:gridCol>
+                <a:gridCol w="1350459">
+                  <a:extLst>
+                    <a:ext uri="{9D8B030D-6E8A-4147-A177-3AD203B41FA5}">
+                      <a16:colId xmlns:a16="http://schemas.microsoft.com/office/drawing/2014/main" val="275376594"/>
+                    </a:ext>
+                  </a:extLst>
+                </a:gridCol>
+                <a:gridCol w="1350459">
+                  <a:extLst>
+                    <a:ext uri="{9D8B030D-6E8A-4147-A177-3AD203B41FA5}">
+                      <a16:colId xmlns:a16="http://schemas.microsoft.com/office/drawing/2014/main" val="2136143911"/>
+                    </a:ext>
+                  </a:extLst>
+                </a:gridCol>
+                <a:gridCol w="1350459">
+                  <a:extLst>
+                    <a:ext uri="{9D8B030D-6E8A-4147-A177-3AD203B41FA5}">
+                      <a16:colId xmlns:a16="http://schemas.microsoft.com/office/drawing/2014/main" val="419571733"/>
+                    </a:ext>
+                  </a:extLst>
+                </a:gridCol>
+                <a:gridCol w="1350459">
+                  <a:extLst>
+                    <a:ext uri="{9D8B030D-6E8A-4147-A177-3AD203B41FA5}">
+                      <a16:colId xmlns:a16="http://schemas.microsoft.com/office/drawing/2014/main" val="503600666"/>
+                    </a:ext>
+                  </a:extLst>
+                </a:gridCol>
+              </a:tblGrid>
+              <a:tr h="1212574">
+                <a:tc>
+                  <a:txBody>
+                    <a:bodyPr/>
+                    <a:lstStyle/>
+                    <a:p>
+                      <a:pPr algn="ctr"/>
+                      <a:r>
+                        <a:rPr lang="zh-CN" altLang="en-US" dirty="0" smtClean="0"/>
+                        <a:t>框架</a:t>
+                      </a:r>
+                      <a:endParaRPr lang="zh-CN" altLang="en-US" dirty="0"/>
+                    </a:p>
+                  </a:txBody>
+                  <a:tcPr>
+                    <a:solidFill>
+                      <a:srgbClr val="002060"/>
+                    </a:solidFill>
+                  </a:tcPr>
+                </a:tc>
+                <a:tc>
+                  <a:txBody>
+                    <a:bodyPr/>
+                    <a:lstStyle/>
+                    <a:p>
+                      <a:pPr algn="ctr"/>
+                      <a:r>
+                        <a:rPr lang="en-US" altLang="zh-CN" sz="1800" b="1" i="0" kern="1200" dirty="0" smtClean="0">
+                          <a:solidFill>
+                            <a:schemeClr val="lt1"/>
+                          </a:solidFill>
+                          <a:effectLst/>
+                          <a:latin typeface="+mn-lt"/>
+                          <a:ea typeface="+mn-ea"/>
+                          <a:cs typeface="+mn-cs"/>
+                        </a:rPr>
+                        <a:t>Json</a:t>
+                      </a:r>
+                      <a:endParaRPr lang="zh-CN" altLang="en-US" dirty="0"/>
+                    </a:p>
+                  </a:txBody>
+                  <a:tcPr>
+                    <a:solidFill>
+                      <a:schemeClr val="tx1">
+                        <a:lumMod val="50000"/>
+                        <a:lumOff val="50000"/>
+                      </a:schemeClr>
+                    </a:solidFill>
+                  </a:tcPr>
+                </a:tc>
+                <a:tc>
+                  <a:txBody>
+                    <a:bodyPr/>
+                    <a:lstStyle/>
+                    <a:p>
+                      <a:pPr algn="ctr"/>
+                      <a:r>
+                        <a:rPr lang="en-US" altLang="zh-CN" dirty="0" smtClean="0"/>
+                        <a:t>msgpack</a:t>
+                      </a:r>
+                      <a:endParaRPr lang="zh-CN" altLang="en-US" b="1" dirty="0"/>
+                    </a:p>
+                  </a:txBody>
+                  <a:tcPr>
+                    <a:solidFill>
+                      <a:schemeClr val="accent4">
+                        <a:lumMod val="75000"/>
+                      </a:schemeClr>
+                    </a:solidFill>
+                  </a:tcPr>
+                </a:tc>
+                <a:tc>
+                  <a:txBody>
+                    <a:bodyPr/>
+                    <a:lstStyle/>
+                    <a:p>
+                      <a:pPr algn="ctr"/>
+                      <a:r>
+                        <a:rPr lang="en-US" altLang="zh-CN" dirty="0" smtClean="0"/>
+                        <a:t>XML</a:t>
+                      </a:r>
+                      <a:endParaRPr lang="zh-CN" altLang="en-US" dirty="0"/>
+                    </a:p>
+                  </a:txBody>
+                  <a:tcPr>
+                    <a:solidFill>
+                      <a:schemeClr val="accent1">
+                        <a:lumMod val="75000"/>
+                      </a:schemeClr>
+                    </a:solidFill>
+                  </a:tcPr>
+                </a:tc>
+                <a:tc>
+                  <a:txBody>
+                    <a:bodyPr/>
+                    <a:lstStyle/>
+                    <a:p>
+                      <a:pPr algn="ctr"/>
+                      <a:r>
+                        <a:rPr lang="en-US" altLang="zh-CN" dirty="0" smtClean="0"/>
+                        <a:t>Protocol Buffer</a:t>
+                      </a:r>
+                    </a:p>
+                    <a:p>
+                      <a:pPr algn="ctr"/>
+                      <a:endParaRPr lang="zh-CN" altLang="en-US" dirty="0"/>
+                    </a:p>
+                  </a:txBody>
+                  <a:tcPr>
+                    <a:solidFill>
+                      <a:schemeClr val="accent2">
+                        <a:lumMod val="75000"/>
+                      </a:schemeClr>
+                    </a:solidFill>
+                  </a:tcPr>
+                </a:tc>
+                <a:tc>
+                  <a:txBody>
+                    <a:bodyPr/>
+                    <a:lstStyle/>
+                    <a:p>
+                      <a:pPr algn="ctr"/>
+                      <a:r>
+                        <a:rPr lang="en-US" altLang="zh-CN" dirty="0" smtClean="0"/>
+                        <a:t>Thrift</a:t>
+                      </a:r>
+                      <a:endParaRPr lang="zh-CN" altLang="en-US" dirty="0"/>
+                    </a:p>
+                  </a:txBody>
+                  <a:tcPr>
+                    <a:solidFill>
+                      <a:schemeClr val="accent3">
+                        <a:lumMod val="50000"/>
+                      </a:schemeClr>
+                    </a:solidFill>
+                  </a:tcPr>
+                </a:tc>
+                <a:tc>
+                  <a:txBody>
+                    <a:bodyPr/>
+                    <a:lstStyle/>
+                    <a:p>
+                      <a:pPr algn="ctr"/>
+                      <a:r>
+                        <a:rPr lang="en-US" altLang="zh-CN" dirty="0" smtClean="0"/>
+                        <a:t>Avro</a:t>
+                      </a:r>
+                      <a:endParaRPr lang="zh-CN" altLang="en-US" dirty="0"/>
+                    </a:p>
+                  </a:txBody>
+                  <a:tcPr>
+                    <a:solidFill>
+                      <a:schemeClr val="accent6">
+                        <a:lumMod val="75000"/>
+                      </a:schemeClr>
+                    </a:solidFill>
+                  </a:tcPr>
+                </a:tc>
+                <a:extLst>
+                  <a:ext uri="{0D108BD9-81ED-4DB2-BD59-A6C34878D82A}">
+                    <a16:rowId xmlns:a16="http://schemas.microsoft.com/office/drawing/2014/main" val="3627524871"/>
+                  </a:ext>
+                </a:extLst>
+              </a:tr>
+              <a:tr h="1212574">
+                <a:tc>
+                  <a:txBody>
+                    <a:bodyPr/>
+                    <a:lstStyle/>
+                    <a:p>
+                      <a:pPr algn="ctr"/>
+                      <a:r>
+                        <a:rPr lang="zh-CN" altLang="en-US" dirty="0" smtClean="0">
+                          <a:solidFill>
+                            <a:schemeClr val="bg1"/>
+                          </a:solidFill>
+                        </a:rPr>
+                        <a:t>字节大小</a:t>
+                      </a:r>
+                      <a:endParaRPr lang="zh-CN" altLang="en-US" dirty="0">
+                        <a:solidFill>
+                          <a:schemeClr val="bg1"/>
+                        </a:solidFill>
+                      </a:endParaRPr>
+                    </a:p>
+                  </a:txBody>
+                  <a:tcPr>
+                    <a:solidFill>
+                      <a:srgbClr val="002060"/>
+                    </a:solidFill>
+                  </a:tcPr>
+                </a:tc>
+                <a:tc>
+                  <a:txBody>
+                    <a:bodyPr/>
+                    <a:lstStyle/>
+                    <a:p>
+                      <a:pPr algn="ctr"/>
+                      <a:endParaRPr lang="zh-CN" altLang="en-US" dirty="0">
+                        <a:solidFill>
+                          <a:schemeClr val="bg1"/>
+                        </a:solidFill>
+                      </a:endParaRPr>
+                    </a:p>
+                  </a:txBody>
+                  <a:tcPr>
+                    <a:solidFill>
+                      <a:schemeClr val="tx1">
+                        <a:lumMod val="50000"/>
+                        <a:lumOff val="50000"/>
+                      </a:schemeClr>
+                    </a:solidFill>
+                  </a:tcPr>
+                </a:tc>
+                <a:tc>
+                  <a:txBody>
+                    <a:bodyPr/>
+                    <a:lstStyle/>
+                    <a:p>
+                      <a:pPr algn="ctr"/>
+                      <a:endParaRPr lang="zh-CN" altLang="en-US" b="1" dirty="0">
+                        <a:solidFill>
+                          <a:schemeClr val="bg1"/>
+                        </a:solidFill>
+                      </a:endParaRPr>
+                    </a:p>
+                  </a:txBody>
+                  <a:tcPr>
+                    <a:solidFill>
+                      <a:schemeClr val="accent4">
+                        <a:lumMod val="75000"/>
+                      </a:schemeClr>
+                    </a:solidFill>
+                  </a:tcPr>
+                </a:tc>
+                <a:tc>
+                  <a:txBody>
+                    <a:bodyPr/>
+                    <a:lstStyle/>
+                    <a:p>
+                      <a:pPr algn="ctr"/>
+                      <a:endParaRPr lang="zh-CN" altLang="en-US" dirty="0"/>
+                    </a:p>
+                  </a:txBody>
+                  <a:tcPr>
+                    <a:solidFill>
+                      <a:schemeClr val="accent1">
+                        <a:lumMod val="75000"/>
+                      </a:schemeClr>
+                    </a:solidFill>
+                  </a:tcPr>
+                </a:tc>
+                <a:tc>
+                  <a:txBody>
+                    <a:bodyPr/>
+                    <a:lstStyle/>
+                    <a:p>
+                      <a:pPr algn="ctr"/>
+                      <a:endParaRPr lang="zh-CN" altLang="en-US" b="1" dirty="0">
+                        <a:solidFill>
+                          <a:schemeClr val="bg1"/>
+                        </a:solidFill>
+                      </a:endParaRPr>
+                    </a:p>
+                  </a:txBody>
+                  <a:tcPr>
+                    <a:solidFill>
+                      <a:schemeClr val="accent2">
+                        <a:lumMod val="75000"/>
+                      </a:schemeClr>
+                    </a:solidFill>
+                  </a:tcPr>
+                </a:tc>
+                <a:tc>
+                  <a:txBody>
+                    <a:bodyPr/>
+                    <a:lstStyle/>
+                    <a:p>
+                      <a:pPr algn="ctr"/>
+                      <a:endParaRPr lang="zh-CN" altLang="en-US" b="1" dirty="0">
+                        <a:solidFill>
+                          <a:schemeClr val="bg1"/>
+                        </a:solidFill>
+                      </a:endParaRPr>
+                    </a:p>
+                  </a:txBody>
+                  <a:tcPr>
+                    <a:solidFill>
+                      <a:schemeClr val="accent3">
+                        <a:lumMod val="50000"/>
+                      </a:schemeClr>
+                    </a:solidFill>
+                  </a:tcPr>
+                </a:tc>
+                <a:tc>
+                  <a:txBody>
+                    <a:bodyPr/>
+                    <a:lstStyle/>
+                    <a:p>
+                      <a:pPr algn="ctr"/>
+                      <a:endParaRPr lang="zh-CN" altLang="en-US" b="1" dirty="0">
+                        <a:solidFill>
+                          <a:schemeClr val="bg1"/>
+                        </a:solidFill>
+                      </a:endParaRPr>
+                    </a:p>
+                  </a:txBody>
+                  <a:tcPr>
+                    <a:solidFill>
+                      <a:schemeClr val="accent6">
+                        <a:lumMod val="75000"/>
+                      </a:schemeClr>
+                    </a:solidFill>
+                  </a:tcPr>
+                </a:tc>
+                <a:extLst>
+                  <a:ext uri="{0D108BD9-81ED-4DB2-BD59-A6C34878D82A}">
+                    <a16:rowId xmlns:a16="http://schemas.microsoft.com/office/drawing/2014/main" val="3445323007"/>
+                  </a:ext>
+                </a:extLst>
+              </a:tr>
+              <a:tr h="1212574">
+                <a:tc>
+                  <a:txBody>
+                    <a:bodyPr/>
+                    <a:lstStyle/>
+                    <a:p>
+                      <a:pPr algn="ctr"/>
+                      <a:r>
+                        <a:rPr lang="zh-CN" altLang="en-US" dirty="0" smtClean="0">
+                          <a:solidFill>
+                            <a:schemeClr val="bg1"/>
+                          </a:solidFill>
+                        </a:rPr>
+                        <a:t>序列化时间</a:t>
+                      </a:r>
+                      <a:endParaRPr lang="zh-CN" altLang="en-US" dirty="0">
+                        <a:solidFill>
+                          <a:schemeClr val="bg1"/>
+                        </a:solidFill>
+                      </a:endParaRPr>
+                    </a:p>
+                  </a:txBody>
+                  <a:tcPr>
+                    <a:solidFill>
+                      <a:srgbClr val="002060"/>
+                    </a:solidFill>
+                  </a:tcPr>
+                </a:tc>
+                <a:tc>
+                  <a:txBody>
+                    <a:bodyPr/>
+                    <a:lstStyle/>
+                    <a:p>
+                      <a:pPr algn="ctr"/>
+                      <a:endParaRPr lang="zh-CN" altLang="en-US" dirty="0">
+                        <a:solidFill>
+                          <a:schemeClr val="bg1"/>
+                        </a:solidFill>
+                      </a:endParaRPr>
+                    </a:p>
+                  </a:txBody>
+                  <a:tcPr>
+                    <a:solidFill>
+                      <a:schemeClr val="tx1">
+                        <a:lumMod val="50000"/>
+                        <a:lumOff val="50000"/>
+                      </a:schemeClr>
+                    </a:solidFill>
+                  </a:tcPr>
+                </a:tc>
+                <a:tc>
+                  <a:txBody>
+                    <a:bodyPr/>
+                    <a:lstStyle/>
+                    <a:p>
+                      <a:pPr algn="ctr"/>
+                      <a:endParaRPr lang="zh-CN" altLang="en-US" b="1" dirty="0">
+                        <a:solidFill>
+                          <a:schemeClr val="bg1"/>
+                        </a:solidFill>
+                      </a:endParaRPr>
+                    </a:p>
+                  </a:txBody>
+                  <a:tcPr>
+                    <a:solidFill>
+                      <a:schemeClr val="accent4">
+                        <a:lumMod val="75000"/>
+                      </a:schemeClr>
+                    </a:solidFill>
+                  </a:tcPr>
+                </a:tc>
+                <a:tc>
+                  <a:txBody>
+                    <a:bodyPr/>
+                    <a:lstStyle/>
+                    <a:p>
+                      <a:pPr algn="ctr"/>
+                      <a:endParaRPr lang="zh-CN" altLang="en-US" dirty="0"/>
+                    </a:p>
+                  </a:txBody>
+                  <a:tcPr>
+                    <a:solidFill>
+                      <a:schemeClr val="accent1">
+                        <a:lumMod val="75000"/>
+                      </a:schemeClr>
+                    </a:solidFill>
+                  </a:tcPr>
+                </a:tc>
+                <a:tc>
+                  <a:txBody>
+                    <a:bodyPr/>
+                    <a:lstStyle/>
+                    <a:p>
+                      <a:pPr algn="ctr"/>
+                      <a:endParaRPr lang="zh-CN" altLang="en-US" b="1" dirty="0">
+                        <a:solidFill>
+                          <a:schemeClr val="bg1"/>
+                        </a:solidFill>
+                      </a:endParaRPr>
+                    </a:p>
+                  </a:txBody>
+                  <a:tcPr>
+                    <a:solidFill>
+                      <a:schemeClr val="accent2">
+                        <a:lumMod val="75000"/>
+                      </a:schemeClr>
+                    </a:solidFill>
+                  </a:tcPr>
+                </a:tc>
+                <a:tc>
+                  <a:txBody>
+                    <a:bodyPr/>
+                    <a:lstStyle/>
+                    <a:p>
+                      <a:pPr algn="ctr"/>
+                      <a:endParaRPr lang="zh-CN" altLang="en-US" b="1" dirty="0">
+                        <a:solidFill>
+                          <a:schemeClr val="bg1"/>
+                        </a:solidFill>
+                      </a:endParaRPr>
+                    </a:p>
+                  </a:txBody>
+                  <a:tcPr>
+                    <a:solidFill>
+                      <a:schemeClr val="accent3">
+                        <a:lumMod val="50000"/>
+                      </a:schemeClr>
+                    </a:solidFill>
+                  </a:tcPr>
+                </a:tc>
+                <a:tc>
+                  <a:txBody>
+                    <a:bodyPr/>
+                    <a:lstStyle/>
+                    <a:p>
+                      <a:pPr algn="ctr"/>
+                      <a:endParaRPr lang="zh-CN" altLang="en-US" b="1" dirty="0">
+                        <a:solidFill>
+                          <a:schemeClr val="bg1"/>
+                        </a:solidFill>
+                      </a:endParaRPr>
+                    </a:p>
+                  </a:txBody>
+                  <a:tcPr>
+                    <a:solidFill>
+                      <a:schemeClr val="accent6">
+                        <a:lumMod val="75000"/>
+                      </a:schemeClr>
+                    </a:solidFill>
+                  </a:tcPr>
+                </a:tc>
+                <a:extLst>
+                  <a:ext uri="{0D108BD9-81ED-4DB2-BD59-A6C34878D82A}">
+                    <a16:rowId xmlns:a16="http://schemas.microsoft.com/office/drawing/2014/main" val="1217525799"/>
+                  </a:ext>
+                </a:extLst>
+              </a:tr>
+              <a:tr h="1212574">
+                <a:tc>
+                  <a:txBody>
+                    <a:bodyPr/>
+                    <a:lstStyle/>
+                    <a:p>
+                      <a:pPr algn="ctr"/>
+                      <a:r>
+                        <a:rPr lang="zh-CN" altLang="en-US" dirty="0" smtClean="0">
+                          <a:solidFill>
+                            <a:schemeClr val="bg1"/>
+                          </a:solidFill>
+                        </a:rPr>
+                        <a:t>反序列化</a:t>
+                      </a:r>
+                      <a:endParaRPr lang="en-US" altLang="zh-CN" dirty="0" smtClean="0">
+                        <a:solidFill>
+                          <a:schemeClr val="bg1"/>
+                        </a:solidFill>
+                      </a:endParaRPr>
+                    </a:p>
+                    <a:p>
+                      <a:pPr algn="ctr"/>
+                      <a:r>
+                        <a:rPr lang="zh-CN" altLang="en-US" dirty="0" smtClean="0">
+                          <a:solidFill>
+                            <a:schemeClr val="bg1"/>
+                          </a:solidFill>
+                        </a:rPr>
+                        <a:t>时间</a:t>
+                      </a:r>
+                      <a:endParaRPr lang="zh-CN" altLang="en-US" dirty="0">
+                        <a:solidFill>
+                          <a:schemeClr val="bg1"/>
+                        </a:solidFill>
+                      </a:endParaRPr>
+                    </a:p>
+                  </a:txBody>
+                  <a:tcPr>
+                    <a:solidFill>
+                      <a:srgbClr val="002060"/>
+                    </a:solidFill>
+                  </a:tcPr>
+                </a:tc>
+                <a:tc>
+                  <a:txBody>
+                    <a:bodyPr/>
+                    <a:lstStyle/>
+                    <a:p>
+                      <a:pPr algn="ctr"/>
+                      <a:endParaRPr lang="zh-CN" altLang="en-US" dirty="0">
+                        <a:solidFill>
+                          <a:schemeClr val="bg1"/>
+                        </a:solidFill>
+                      </a:endParaRPr>
+                    </a:p>
+                  </a:txBody>
+                  <a:tcPr>
+                    <a:solidFill>
+                      <a:schemeClr val="tx1">
+                        <a:lumMod val="50000"/>
+                        <a:lumOff val="50000"/>
+                      </a:schemeClr>
+                    </a:solidFill>
+                  </a:tcPr>
+                </a:tc>
+                <a:tc>
+                  <a:txBody>
+                    <a:bodyPr/>
+                    <a:lstStyle/>
+                    <a:p>
+                      <a:pPr algn="ctr"/>
+                      <a:endParaRPr lang="zh-CN" altLang="en-US" b="1" dirty="0">
+                        <a:solidFill>
+                          <a:schemeClr val="bg1"/>
+                        </a:solidFill>
+                      </a:endParaRPr>
+                    </a:p>
+                  </a:txBody>
+                  <a:tcPr>
+                    <a:solidFill>
+                      <a:schemeClr val="accent4">
+                        <a:lumMod val="75000"/>
+                      </a:schemeClr>
+                    </a:solidFill>
+                  </a:tcPr>
+                </a:tc>
+                <a:tc>
+                  <a:txBody>
+                    <a:bodyPr/>
+                    <a:lstStyle/>
+                    <a:p>
+                      <a:pPr algn="ctr"/>
+                      <a:endParaRPr lang="zh-CN" altLang="en-US" dirty="0"/>
+                    </a:p>
+                  </a:txBody>
+                  <a:tcPr>
+                    <a:solidFill>
+                      <a:schemeClr val="accent1">
+                        <a:lumMod val="75000"/>
+                      </a:schemeClr>
+                    </a:solidFill>
+                  </a:tcPr>
+                </a:tc>
+                <a:tc>
+                  <a:txBody>
+                    <a:bodyPr/>
+                    <a:lstStyle/>
+                    <a:p>
+                      <a:pPr algn="ctr"/>
+                      <a:endParaRPr lang="zh-CN" altLang="en-US" b="1" dirty="0">
+                        <a:solidFill>
+                          <a:schemeClr val="bg1"/>
+                        </a:solidFill>
+                      </a:endParaRPr>
+                    </a:p>
+                  </a:txBody>
+                  <a:tcPr>
+                    <a:solidFill>
+                      <a:schemeClr val="accent2">
+                        <a:lumMod val="75000"/>
+                      </a:schemeClr>
+                    </a:solidFill>
+                  </a:tcPr>
+                </a:tc>
+                <a:tc>
+                  <a:txBody>
+                    <a:bodyPr/>
+                    <a:lstStyle/>
+                    <a:p>
+                      <a:pPr algn="ctr"/>
+                      <a:endParaRPr lang="zh-CN" altLang="en-US" b="1" dirty="0">
+                        <a:solidFill>
+                          <a:schemeClr val="bg1"/>
+                        </a:solidFill>
+                      </a:endParaRPr>
+                    </a:p>
+                  </a:txBody>
+                  <a:tcPr>
+                    <a:solidFill>
+                      <a:schemeClr val="accent3">
+                        <a:lumMod val="50000"/>
+                      </a:schemeClr>
+                    </a:solidFill>
+                  </a:tcPr>
+                </a:tc>
+                <a:tc>
+                  <a:txBody>
+                    <a:bodyPr/>
+                    <a:lstStyle/>
+                    <a:p>
+                      <a:pPr algn="ctr"/>
+                      <a:endParaRPr lang="zh-CN" altLang="en-US" b="1" dirty="0">
+                        <a:solidFill>
+                          <a:schemeClr val="bg1"/>
+                        </a:solidFill>
+                      </a:endParaRPr>
+                    </a:p>
+                  </a:txBody>
+                  <a:tcPr>
+                    <a:solidFill>
+                      <a:schemeClr val="accent6">
+                        <a:lumMod val="75000"/>
+                      </a:schemeClr>
+                    </a:solidFill>
+                  </a:tcPr>
+                </a:tc>
+                <a:extLst>
+                  <a:ext uri="{0D108BD9-81ED-4DB2-BD59-A6C34878D82A}">
+                    <a16:rowId xmlns:a16="http://schemas.microsoft.com/office/drawing/2014/main" val="3151047742"/>
+                  </a:ext>
+                </a:extLst>
+              </a:tr>
+            </a:tbl>
+          </a:graphicData>
+        </a:graphic>
+      </p:graphicFrame>
+      <p:sp>
+        <p:nvSpPr>
+          <p:cNvPr id="9" name="Footer Placeholder 5"/>
+          <p:cNvSpPr>
+            <a:spLocks noGrp="1"/>
+          </p:cNvSpPr>
+          <p:nvPr>
+            <p:ph type="ftr" sz="quarter" idx="11"/>
+          </p:nvPr>
+        </p:nvSpPr>
+        <p:spPr>
+          <a:xfrm>
+            <a:off x="4038600" y="6397915"/>
+            <a:ext cx="4114800" cy="365125"/>
+          </a:xfrm>
+        </p:spPr>
+        <p:txBody>
+          <a:bodyPr/>
+          <a:lstStyle/>
+          <a:p>
+            <a:r>
+              <a:rPr lang="en-AU" dirty="0"/>
+              <a:t>http://ulord.one/</a:t>
+            </a:r>
+          </a:p>
+        </p:txBody>
+      </p:sp>
+      <p:sp>
+        <p:nvSpPr>
+          <p:cNvPr id="10" name="Slide Number Placeholder 6"/>
+          <p:cNvSpPr>
+            <a:spLocks noGrp="1"/>
+          </p:cNvSpPr>
+          <p:nvPr>
+            <p:ph type="sldNum" sz="quarter" idx="12"/>
+          </p:nvPr>
+        </p:nvSpPr>
+        <p:spPr>
+          <a:xfrm>
+            <a:off x="8991600" y="6397915"/>
+            <a:ext cx="2881744" cy="365125"/>
+          </a:xfrm>
+        </p:spPr>
+        <p:txBody>
+          <a:bodyPr/>
+          <a:lstStyle/>
+          <a:p>
+            <a:fld id="{870C8D18-4AA2-4B61-82ED-E847FE7F510A}" type="slidenum">
+              <a:rPr lang="en-AU" smtClean="0"/>
+              <a:pPr/>
+              <a:t>9</a:t>
+            </a:fld>
+            <a:endParaRPr lang="en-AU" dirty="0"/>
+          </a:p>
+        </p:txBody>
+      </p:sp>
+      <p:pic>
+        <p:nvPicPr>
+          <p:cNvPr id="11" name="图片 10"/>
+          <p:cNvPicPr>
+            <a:picLocks noChangeAspect="1"/>
+          </p:cNvPicPr>
+          <p:nvPr/>
+        </p:nvPicPr>
+        <p:blipFill>
+          <a:blip r:embed="rId2" cstate="print">
+            <a:extLst>
+              <a:ext uri="{28A0092B-C50C-407E-A947-70E740481C1C}">
+                <a14:useLocalDpi xmlns:a14="http://schemas.microsoft.com/office/drawing/2010/main" val="0"/>
+              </a:ext>
+            </a:extLst>
+          </a:blip>
+          <a:stretch>
+            <a:fillRect/>
+          </a:stretch>
+        </p:blipFill>
+        <p:spPr>
+          <a:xfrm>
+            <a:off x="122664" y="6197018"/>
+            <a:ext cx="1990371" cy="545813"/>
+          </a:xfrm>
+          <a:prstGeom prst="rect">
+            <a:avLst/>
+          </a:prstGeom>
+        </p:spPr>
+      </p:pic>
+    </p:spTree>
+    <p:extLst>
+      <p:ext uri="{BB962C8B-B14F-4D97-AF65-F5344CB8AC3E}">
+        <p14:creationId xmlns:p14="http://schemas.microsoft.com/office/powerpoint/2010/main" val="351233679"/>
+      </p:ext>
+    </p:extLst>
+  </p:cSld>
+  <p:clrMapOvr>
+    <a:masterClrMapping/>
+  </p:clrMapOvr>
+  <mc:AlternateContent xmlns:mc="http://schemas.openxmlformats.org/markup-compatibility/2006" xmlns:p14="http://schemas.microsoft.com/office/powerpoint/2010/main">
+    <mc:Choice Requires="p14">
+      <p:transition spd="slow" p14:dur="2000"/>
+    </mc:Choice>
+    <mc:Fallback xmlns="">
+      <p:transition spd="slow"/>
+    </mc:Fallback>
+  </mc:AlternateContent>
+</p:sld>
+</file>
+
+<file path=ppt/slides/slide9.xml><?xml version="1.0" encoding="utf-8"?>
+<p:sld xmlns:a="http://schemas.openxmlformats.org/drawingml/2006/main" xmlns:r="http://schemas.openxmlformats.org/officeDocument/2006/relationships" xmlns:p="http://schemas.openxmlformats.org/presentationml/2006/main">
+  <p:cSld>
+    <p:spTree>
+      <p:nvGrpSpPr>
+        <p:cNvPr id="1" name=""/>
+        <p:cNvGrpSpPr/>
+        <p:nvPr/>
+      </p:nvGrpSpPr>
+      <p:grpSpPr>
+        <a:xfrm>
+          <a:off x="0" y="0"/>
+          <a:ext cx="0" cy="0"/>
+          <a:chOff x="0" y="0"/>
+          <a:chExt cx="0" cy="0"/>
+        </a:xfrm>
+      </p:grpSpPr>
+      <p:sp>
+        <p:nvSpPr>
+          <p:cNvPr id="7" name="Footer Placeholder 5"/>
+          <p:cNvSpPr>
+            <a:spLocks noGrp="1"/>
+          </p:cNvSpPr>
+          <p:nvPr>
+            <p:ph type="ftr" sz="quarter" idx="11"/>
+          </p:nvPr>
+        </p:nvSpPr>
+        <p:spPr>
+          <a:xfrm>
+            <a:off x="4038600" y="6397915"/>
+            <a:ext cx="4114800" cy="365125"/>
+          </a:xfrm>
+        </p:spPr>
+        <p:txBody>
+          <a:bodyPr/>
+          <a:lstStyle/>
+          <a:p>
+            <a:r>
+              <a:rPr lang="en-AU" dirty="0"/>
+              <a:t>http://ulord.one/</a:t>
+            </a:r>
+          </a:p>
+        </p:txBody>
+      </p:sp>
+      <p:sp>
+        <p:nvSpPr>
+          <p:cNvPr id="8" name="Slide Number Placeholder 6"/>
+          <p:cNvSpPr>
+            <a:spLocks noGrp="1"/>
+          </p:cNvSpPr>
+          <p:nvPr>
+            <p:ph type="sldNum" sz="quarter" idx="12"/>
+          </p:nvPr>
+        </p:nvSpPr>
+        <p:spPr>
+          <a:xfrm>
+            <a:off x="8991600" y="6397915"/>
+            <a:ext cx="2881744" cy="365125"/>
+          </a:xfrm>
+        </p:spPr>
+        <p:txBody>
+          <a:bodyPr/>
+          <a:lstStyle/>
+          <a:p>
+            <a:fld id="{870C8D18-4AA2-4B61-82ED-E847FE7F510A}" type="slidenum">
+              <a:rPr lang="en-AU" smtClean="0"/>
+              <a:pPr/>
+              <a:t>9</a:t>
             </a:fld>
             <a:endParaRPr lang="en-AU" dirty="0"/>
           </a:p>
@@ -13330,350 +15106,6 @@
     <p:extLst>
       <p:ext uri="{BB962C8B-B14F-4D97-AF65-F5344CB8AC3E}">
         <p14:creationId xmlns:p14="http://schemas.microsoft.com/office/powerpoint/2010/main" val="2275993145"/>
-      </p:ext>
-    </p:extLst>
-  </p:cSld>
-  <p:clrMapOvr>
-    <a:masterClrMapping/>
-  </p:clrMapOvr>
-  <mc:AlternateContent xmlns:mc="http://schemas.openxmlformats.org/markup-compatibility/2006" xmlns:p14="http://schemas.microsoft.com/office/powerpoint/2010/main">
-    <mc:Choice Requires="p14">
-      <p:transition spd="slow" p14:dur="2000"/>
-    </mc:Choice>
-    <mc:Fallback xmlns="">
-      <p:transition spd="slow"/>
-    </mc:Fallback>
-  </mc:AlternateContent>
-  <p:timing>
-    <p:tnLst>
-      <p:par>
-        <p:cTn id="1" dur="indefinite" restart="never" nodeType="tmRoot"/>
-      </p:par>
-    </p:tnLst>
-  </p:timing>
-</p:sld>
-</file>
-
-<file path=ppt/slides/slide8.xml><?xml version="1.0" encoding="utf-8"?>
-<p:sld xmlns:a="http://schemas.openxmlformats.org/drawingml/2006/main" xmlns:r="http://schemas.openxmlformats.org/officeDocument/2006/relationships" xmlns:p="http://schemas.openxmlformats.org/presentationml/2006/main">
-  <p:cSld>
-    <p:spTree>
-      <p:nvGrpSpPr>
-        <p:cNvPr id="1" name=""/>
-        <p:cNvGrpSpPr/>
-        <p:nvPr/>
-      </p:nvGrpSpPr>
-      <p:grpSpPr>
-        <a:xfrm>
-          <a:off x="0" y="0"/>
-          <a:ext cx="0" cy="0"/>
-          <a:chOff x="0" y="0"/>
-          <a:chExt cx="0" cy="0"/>
-        </a:xfrm>
-      </p:grpSpPr>
-      <p:pic>
-        <p:nvPicPr>
-          <p:cNvPr id="1026" name="Picture 2" descr="http://dl2.iteye.com/upload/attachment/0095/8875/ab7fc234-7169-3968-bdd8-456811d72dea.png"/>
-          <p:cNvPicPr>
-            <a:picLocks noChangeAspect="1" noChangeArrowheads="1"/>
-          </p:cNvPicPr>
-          <p:nvPr/>
-        </p:nvPicPr>
-        <p:blipFill>
-          <a:blip r:embed="rId3">
-            <a:extLst>
-              <a:ext uri="{28A0092B-C50C-407E-A947-70E740481C1C}">
-                <a14:useLocalDpi xmlns:a14="http://schemas.microsoft.com/office/drawing/2010/main" val="0"/>
-              </a:ext>
-            </a:extLst>
-          </a:blip>
-          <a:srcRect/>
-          <a:stretch>
-            <a:fillRect/>
-          </a:stretch>
-        </p:blipFill>
-        <p:spPr bwMode="auto">
-          <a:xfrm>
-            <a:off x="1582930" y="1431499"/>
-            <a:ext cx="8991600" cy="4381501"/>
-          </a:xfrm>
-          <a:prstGeom prst="rect">
-            <a:avLst/>
-          </a:prstGeom>
-          <a:noFill/>
-          <a:extLst>
-            <a:ext uri="{909E8E84-426E-40DD-AFC4-6F175D3DCCD1}">
-              <a14:hiddenFill xmlns:a14="http://schemas.microsoft.com/office/drawing/2010/main">
-                <a:solidFill>
-                  <a:srgbClr val="FFFFFF"/>
-                </a:solidFill>
-              </a14:hiddenFill>
-            </a:ext>
-          </a:extLst>
-        </p:spPr>
-      </p:pic>
-      <p:sp>
-        <p:nvSpPr>
-          <p:cNvPr id="7" name="Footer Placeholder 5"/>
-          <p:cNvSpPr>
-            <a:spLocks noGrp="1"/>
-          </p:cNvSpPr>
-          <p:nvPr>
-            <p:ph type="ftr" sz="quarter" idx="11"/>
-          </p:nvPr>
-        </p:nvSpPr>
-        <p:spPr>
-          <a:xfrm>
-            <a:off x="4038600" y="6397915"/>
-            <a:ext cx="4114800" cy="365125"/>
-          </a:xfrm>
-        </p:spPr>
-        <p:txBody>
-          <a:bodyPr/>
-          <a:lstStyle/>
-          <a:p>
-            <a:r>
-              <a:rPr lang="en-AU" dirty="0"/>
-              <a:t>http://ulord.one/</a:t>
-            </a:r>
-          </a:p>
-        </p:txBody>
-      </p:sp>
-      <p:sp>
-        <p:nvSpPr>
-          <p:cNvPr id="8" name="Slide Number Placeholder 6"/>
-          <p:cNvSpPr>
-            <a:spLocks noGrp="1"/>
-          </p:cNvSpPr>
-          <p:nvPr>
-            <p:ph type="sldNum" sz="quarter" idx="12"/>
-          </p:nvPr>
-        </p:nvSpPr>
-        <p:spPr>
-          <a:xfrm>
-            <a:off x="8991600" y="6397915"/>
-            <a:ext cx="2881744" cy="365125"/>
-          </a:xfrm>
-        </p:spPr>
-        <p:txBody>
-          <a:bodyPr/>
-          <a:lstStyle/>
-          <a:p>
-            <a:fld id="{870C8D18-4AA2-4B61-82ED-E847FE7F510A}" type="slidenum">
-              <a:rPr lang="en-AU" smtClean="0"/>
-              <a:pPr/>
-              <a:t>2</a:t>
-            </a:fld>
-            <a:endParaRPr lang="en-AU" dirty="0"/>
-          </a:p>
-        </p:txBody>
-      </p:sp>
-      <p:pic>
-        <p:nvPicPr>
-          <p:cNvPr id="9" name="图片 8"/>
-          <p:cNvPicPr>
-            <a:picLocks noChangeAspect="1"/>
-          </p:cNvPicPr>
-          <p:nvPr/>
-        </p:nvPicPr>
-        <p:blipFill>
-          <a:blip r:embed="rId4" cstate="print">
-            <a:extLst>
-              <a:ext uri="{28A0092B-C50C-407E-A947-70E740481C1C}">
-                <a14:useLocalDpi xmlns:a14="http://schemas.microsoft.com/office/drawing/2010/main" val="0"/>
-              </a:ext>
-            </a:extLst>
-          </a:blip>
-          <a:stretch>
-            <a:fillRect/>
-          </a:stretch>
-        </p:blipFill>
-        <p:spPr>
-          <a:xfrm>
-            <a:off x="122664" y="6197018"/>
-            <a:ext cx="1990371" cy="545813"/>
-          </a:xfrm>
-          <a:prstGeom prst="rect">
-            <a:avLst/>
-          </a:prstGeom>
-        </p:spPr>
-      </p:pic>
-    </p:spTree>
-    <p:extLst>
-      <p:ext uri="{BB962C8B-B14F-4D97-AF65-F5344CB8AC3E}">
-        <p14:creationId xmlns:p14="http://schemas.microsoft.com/office/powerpoint/2010/main" val="4239772219"/>
-      </p:ext>
-    </p:extLst>
-  </p:cSld>
-  <p:clrMapOvr>
-    <a:masterClrMapping/>
-  </p:clrMapOvr>
-  <mc:AlternateContent xmlns:mc="http://schemas.openxmlformats.org/markup-compatibility/2006" xmlns:p14="http://schemas.microsoft.com/office/powerpoint/2010/main">
-    <mc:Choice Requires="p14">
-      <p:transition spd="slow" p14:dur="2000"/>
-    </mc:Choice>
-    <mc:Fallback xmlns="">
-      <p:transition spd="slow"/>
-    </mc:Fallback>
-  </mc:AlternateContent>
-  <p:timing>
-    <p:tnLst>
-      <p:par>
-        <p:cTn id="1" dur="indefinite" restart="never" nodeType="tmRoot"/>
-      </p:par>
-    </p:tnLst>
-  </p:timing>
-</p:sld>
-</file>
-
-<file path=ppt/slides/slide9.xml><?xml version="1.0" encoding="utf-8"?>
-<p:sld xmlns:a="http://schemas.openxmlformats.org/drawingml/2006/main" xmlns:r="http://schemas.openxmlformats.org/officeDocument/2006/relationships" xmlns:p="http://schemas.openxmlformats.org/presentationml/2006/main">
-  <p:cSld>
-    <p:spTree>
-      <p:nvGrpSpPr>
-        <p:cNvPr id="1" name=""/>
-        <p:cNvGrpSpPr/>
-        <p:nvPr/>
-      </p:nvGrpSpPr>
-      <p:grpSpPr>
-        <a:xfrm>
-          <a:off x="0" y="0"/>
-          <a:ext cx="0" cy="0"/>
-          <a:chOff x="0" y="0"/>
-          <a:chExt cx="0" cy="0"/>
-        </a:xfrm>
-      </p:grpSpPr>
-      <p:pic>
-        <p:nvPicPr>
-          <p:cNvPr id="2050" name="Picture 2" descr="http://dl2.iteye.com/upload/attachment/0095/8879/44f0c34f-45cc-3ed4-ac53-10059b76fc77.png"/>
-          <p:cNvPicPr>
-            <a:picLocks noChangeAspect="1" noChangeArrowheads="1"/>
-          </p:cNvPicPr>
-          <p:nvPr/>
-        </p:nvPicPr>
-        <p:blipFill>
-          <a:blip r:embed="rId2">
-            <a:extLst>
-              <a:ext uri="{28A0092B-C50C-407E-A947-70E740481C1C}">
-                <a14:useLocalDpi xmlns:a14="http://schemas.microsoft.com/office/drawing/2010/main" val="0"/>
-              </a:ext>
-            </a:extLst>
-          </a:blip>
-          <a:srcRect/>
-          <a:stretch>
-            <a:fillRect/>
-          </a:stretch>
-        </p:blipFill>
-        <p:spPr bwMode="auto">
-          <a:xfrm>
-            <a:off x="2020270" y="1008820"/>
-            <a:ext cx="8572500" cy="4524375"/>
-          </a:xfrm>
-          <a:prstGeom prst="rect">
-            <a:avLst/>
-          </a:prstGeom>
-          <a:noFill/>
-          <a:extLst>
-            <a:ext uri="{909E8E84-426E-40DD-AFC4-6F175D3DCCD1}">
-              <a14:hiddenFill xmlns:a14="http://schemas.microsoft.com/office/drawing/2010/main">
-                <a:solidFill>
-                  <a:srgbClr val="FFFFFF"/>
-                </a:solidFill>
-              </a14:hiddenFill>
-            </a:ext>
-          </a:extLst>
-        </p:spPr>
-      </p:pic>
-      <p:sp>
-        <p:nvSpPr>
-          <p:cNvPr id="7" name="Footer Placeholder 5"/>
-          <p:cNvSpPr>
-            <a:spLocks noGrp="1"/>
-          </p:cNvSpPr>
-          <p:nvPr>
-            <p:ph type="ftr" sz="quarter" idx="11"/>
-          </p:nvPr>
-        </p:nvSpPr>
-        <p:spPr>
-          <a:xfrm>
-            <a:off x="4038600" y="6397915"/>
-            <a:ext cx="4114800" cy="365125"/>
-          </a:xfrm>
-        </p:spPr>
-        <p:txBody>
-          <a:bodyPr/>
-          <a:lstStyle/>
-          <a:p>
-            <a:r>
-              <a:rPr lang="en-AU" dirty="0"/>
-              <a:t>http://ulord.one/</a:t>
-            </a:r>
-          </a:p>
-        </p:txBody>
-      </p:sp>
-      <p:sp>
-        <p:nvSpPr>
-          <p:cNvPr id="8" name="Slide Number Placeholder 6"/>
-          <p:cNvSpPr>
-            <a:spLocks noGrp="1"/>
-          </p:cNvSpPr>
-          <p:nvPr>
-            <p:ph type="sldNum" sz="quarter" idx="12"/>
-          </p:nvPr>
-        </p:nvSpPr>
-        <p:spPr>
-          <a:xfrm>
-            <a:off x="8991600" y="6397915"/>
-            <a:ext cx="2881744" cy="365125"/>
-          </a:xfrm>
-        </p:spPr>
-        <p:txBody>
-          <a:bodyPr/>
-          <a:lstStyle/>
-          <a:p>
-            <a:fld id="{870C8D18-4AA2-4B61-82ED-E847FE7F510A}" type="slidenum">
-              <a:rPr lang="en-AU" smtClean="0"/>
-              <a:pPr/>
-              <a:t>2</a:t>
-            </a:fld>
-            <a:endParaRPr lang="en-AU" dirty="0"/>
-          </a:p>
-        </p:txBody>
-      </p:sp>
-      <p:pic>
-        <p:nvPicPr>
-          <p:cNvPr id="9" name="图片 8"/>
-          <p:cNvPicPr>
-            <a:picLocks noChangeAspect="1"/>
-          </p:cNvPicPr>
-          <p:nvPr/>
-        </p:nvPicPr>
-        <p:blipFill>
-          <a:blip r:embed="rId3" cstate="print">
-            <a:extLst>
-              <a:ext uri="{28A0092B-C50C-407E-A947-70E740481C1C}">
-                <a14:useLocalDpi xmlns:a14="http://schemas.microsoft.com/office/drawing/2010/main" val="0"/>
-              </a:ext>
-            </a:extLst>
-          </a:blip>
-          <a:stretch>
-            <a:fillRect/>
-          </a:stretch>
-        </p:blipFill>
-        <p:spPr>
-          <a:xfrm>
-            <a:off x="122664" y="6197018"/>
-            <a:ext cx="1990371" cy="545813"/>
-          </a:xfrm>
-          <a:prstGeom prst="rect">
-            <a:avLst/>
-          </a:prstGeom>
-        </p:spPr>
-      </p:pic>
-    </p:spTree>
-    <p:extLst>
-      <p:ext uri="{BB962C8B-B14F-4D97-AF65-F5344CB8AC3E}">
-        <p14:creationId xmlns:p14="http://schemas.microsoft.com/office/powerpoint/2010/main" val="1983066399"/>
       </p:ext>
     </p:extLst>
   </p:cSld>

</xml_diff>